<commit_message>
Editor on List fixed
</commit_message>
<xml_diff>
--- a/docs/Konzept.pptx
+++ b/docs/Konzept.pptx
@@ -3608,7 +3608,7 @@
             <a:pPr lvl="1"/>
             <a:r>
               <a:rPr lang="de-DE" dirty="0"/>
-              <a:t>Aktionen am Projekt ohne Aufgabe</a:t>
+              <a:t>Aktionen am Projekt ohne Aufgabe ✓</a:t>
             </a:r>
           </a:p>
           <a:p>
@@ -3639,7 +3639,7 @@
             <a:pPr lvl="1"/>
             <a:r>
               <a:rPr lang="de-DE" dirty="0"/>
-              <a:t>Summe der Aufwände</a:t>
+              <a:t>Summe der Aufwände ✓</a:t>
             </a:r>
           </a:p>
           <a:p>
@@ -3658,7 +3658,7 @@
             <a:pPr lvl="1"/>
             <a:r>
               <a:rPr lang="de-DE" dirty="0"/>
-              <a:t>Zuordnung in Liste</a:t>
+              <a:t>Zuordnung in Liste ✓</a:t>
             </a:r>
           </a:p>
           <a:p>

</xml_diff>